<commit_message>
add cpp and exe
</commit_message>
<xml_diff>
--- a/專題.pptx
+++ b/專題.pptx
@@ -4,6 +4,10 @@
   <p:sldMasterIdLst>
     <p:sldMasterId id="2147483648" r:id="rId1"/>
   </p:sldMasterIdLst>
+  <p:sldIdLst>
+    <p:sldId id="256" r:id="rId2"/>
+    <p:sldId id="257" r:id="rId3"/>
+  </p:sldIdLst>
   <p:sldSz cx="9144000" cy="6858000" type="screen4x3"/>
   <p:notesSz cx="6858000" cy="9144000"/>
   <p:defaultTextStyle>
@@ -285,7 +289,7 @@
           <a:p>
             <a:fld id="{5BBEAD13-0566-4C6C-97E7-55F17F24B09F}" type="datetimeFigureOut">
               <a:rPr lang="zh-TW" altLang="en-US" smtClean="0"/>
-              <a:t>2006/9/7</a:t>
+              <a:t>2016/10/20</a:t>
             </a:fld>
             <a:endParaRPr lang="zh-TW" altLang="en-US"/>
           </a:p>
@@ -450,7 +454,7 @@
           <a:p>
             <a:fld id="{5BBEAD13-0566-4C6C-97E7-55F17F24B09F}" type="datetimeFigureOut">
               <a:rPr lang="zh-TW" altLang="en-US" smtClean="0"/>
-              <a:t>2006/9/7</a:t>
+              <a:t>2016/10/20</a:t>
             </a:fld>
             <a:endParaRPr lang="zh-TW" altLang="en-US"/>
           </a:p>
@@ -625,7 +629,7 @@
           <a:p>
             <a:fld id="{5BBEAD13-0566-4C6C-97E7-55F17F24B09F}" type="datetimeFigureOut">
               <a:rPr lang="zh-TW" altLang="en-US" smtClean="0"/>
-              <a:t>2006/9/7</a:t>
+              <a:t>2016/10/20</a:t>
             </a:fld>
             <a:endParaRPr lang="zh-TW" altLang="en-US"/>
           </a:p>
@@ -790,7 +794,7 @@
           <a:p>
             <a:fld id="{5BBEAD13-0566-4C6C-97E7-55F17F24B09F}" type="datetimeFigureOut">
               <a:rPr lang="zh-TW" altLang="en-US" smtClean="0"/>
-              <a:t>2006/9/7</a:t>
+              <a:t>2016/10/20</a:t>
             </a:fld>
             <a:endParaRPr lang="zh-TW" altLang="en-US"/>
           </a:p>
@@ -1031,7 +1035,7 @@
           <a:p>
             <a:fld id="{5BBEAD13-0566-4C6C-97E7-55F17F24B09F}" type="datetimeFigureOut">
               <a:rPr lang="zh-TW" altLang="en-US" smtClean="0"/>
-              <a:t>2006/9/7</a:t>
+              <a:t>2016/10/20</a:t>
             </a:fld>
             <a:endParaRPr lang="zh-TW" altLang="en-US"/>
           </a:p>
@@ -1314,7 +1318,7 @@
           <a:p>
             <a:fld id="{5BBEAD13-0566-4C6C-97E7-55F17F24B09F}" type="datetimeFigureOut">
               <a:rPr lang="zh-TW" altLang="en-US" smtClean="0"/>
-              <a:t>2006/9/7</a:t>
+              <a:t>2016/10/20</a:t>
             </a:fld>
             <a:endParaRPr lang="zh-TW" altLang="en-US"/>
           </a:p>
@@ -1731,7 +1735,7 @@
           <a:p>
             <a:fld id="{5BBEAD13-0566-4C6C-97E7-55F17F24B09F}" type="datetimeFigureOut">
               <a:rPr lang="zh-TW" altLang="en-US" smtClean="0"/>
-              <a:t>2006/9/7</a:t>
+              <a:t>2016/10/20</a:t>
             </a:fld>
             <a:endParaRPr lang="zh-TW" altLang="en-US"/>
           </a:p>
@@ -1844,7 +1848,7 @@
           <a:p>
             <a:fld id="{5BBEAD13-0566-4C6C-97E7-55F17F24B09F}" type="datetimeFigureOut">
               <a:rPr lang="zh-TW" altLang="en-US" smtClean="0"/>
-              <a:t>2006/9/7</a:t>
+              <a:t>2016/10/20</a:t>
             </a:fld>
             <a:endParaRPr lang="zh-TW" altLang="en-US"/>
           </a:p>
@@ -1934,7 +1938,7 @@
           <a:p>
             <a:fld id="{5BBEAD13-0566-4C6C-97E7-55F17F24B09F}" type="datetimeFigureOut">
               <a:rPr lang="zh-TW" altLang="en-US" smtClean="0"/>
-              <a:t>2006/9/7</a:t>
+              <a:t>2016/10/20</a:t>
             </a:fld>
             <a:endParaRPr lang="zh-TW" altLang="en-US"/>
           </a:p>
@@ -2206,7 +2210,7 @@
           <a:p>
             <a:fld id="{5BBEAD13-0566-4C6C-97E7-55F17F24B09F}" type="datetimeFigureOut">
               <a:rPr lang="zh-TW" altLang="en-US" smtClean="0"/>
-              <a:t>2006/9/7</a:t>
+              <a:t>2016/10/20</a:t>
             </a:fld>
             <a:endParaRPr lang="zh-TW" altLang="en-US"/>
           </a:p>
@@ -2454,7 +2458,7 @@
           <a:p>
             <a:fld id="{5BBEAD13-0566-4C6C-97E7-55F17F24B09F}" type="datetimeFigureOut">
               <a:rPr lang="zh-TW" altLang="en-US" smtClean="0"/>
-              <a:t>2006/9/7</a:t>
+              <a:t>2016/10/20</a:t>
             </a:fld>
             <a:endParaRPr lang="zh-TW" altLang="en-US"/>
           </a:p>
@@ -2662,7 +2666,7 @@
           <a:p>
             <a:fld id="{5BBEAD13-0566-4C6C-97E7-55F17F24B09F}" type="datetimeFigureOut">
               <a:rPr lang="zh-TW" altLang="en-US" smtClean="0"/>
-              <a:t>2006/9/7</a:t>
+              <a:t>2016/10/20</a:t>
             </a:fld>
             <a:endParaRPr lang="zh-TW" altLang="en-US"/>
           </a:p>
@@ -3013,6 +3017,180 @@
     </p:otherStyle>
   </p:txStyles>
 </p:sldMaster>
+</file>
+
+<file path=ppt/slides/slide1.xml><?xml version="1.0" encoding="utf-8"?>
+<p:sld xmlns:a="http://schemas.openxmlformats.org/drawingml/2006/main" xmlns:r="http://schemas.openxmlformats.org/officeDocument/2006/relationships" xmlns:p="http://schemas.openxmlformats.org/presentationml/2006/main">
+  <p:cSld>
+    <p:spTree>
+      <p:nvGrpSpPr>
+        <p:cNvPr id="1" name=""/>
+        <p:cNvGrpSpPr/>
+        <p:nvPr/>
+      </p:nvGrpSpPr>
+      <p:grpSpPr>
+        <a:xfrm>
+          <a:off x="0" y="0"/>
+          <a:ext cx="0" cy="0"/>
+          <a:chOff x="0" y="0"/>
+          <a:chExt cx="0" cy="0"/>
+        </a:xfrm>
+      </p:grpSpPr>
+      <p:sp>
+        <p:nvSpPr>
+          <p:cNvPr id="2" name="標題 1"/>
+          <p:cNvSpPr>
+            <a:spLocks noGrp="1"/>
+          </p:cNvSpPr>
+          <p:nvPr>
+            <p:ph type="ctrTitle"/>
+          </p:nvPr>
+        </p:nvSpPr>
+        <p:spPr>
+          <a:xfrm>
+            <a:off x="683568" y="548680"/>
+            <a:ext cx="7772400" cy="1470025"/>
+          </a:xfrm>
+        </p:spPr>
+        <p:txBody>
+          <a:bodyPr/>
+          <a:lstStyle/>
+          <a:p>
+            <a:r>
+              <a:rPr lang="zh-TW" altLang="en-US" dirty="0" smtClean="0"/>
+              <a:t>費氏數列對質數</a:t>
+            </a:r>
+            <a:r>
+              <a:rPr lang="en-US" altLang="zh-TW" dirty="0" smtClean="0"/>
+              <a:t>N</a:t>
+            </a:r>
+            <a:r>
+              <a:rPr lang="zh-TW" altLang="en-US" dirty="0" smtClean="0"/>
+              <a:t>次方取餘數循環關係</a:t>
+            </a:r>
+            <a:endParaRPr lang="zh-TW" altLang="en-US" dirty="0"/>
+          </a:p>
+        </p:txBody>
+      </p:sp>
+      <p:sp>
+        <p:nvSpPr>
+          <p:cNvPr id="3" name="副標題 2"/>
+          <p:cNvSpPr>
+            <a:spLocks noGrp="1"/>
+          </p:cNvSpPr>
+          <p:nvPr>
+            <p:ph type="subTitle" idx="1"/>
+          </p:nvPr>
+        </p:nvSpPr>
+        <p:spPr/>
+        <p:txBody>
+          <a:bodyPr/>
+          <a:lstStyle/>
+          <a:p>
+            <a:r>
+              <a:rPr lang="en-US" altLang="zh-TW" dirty="0" smtClean="0"/>
+              <a:t>By googleak28282</a:t>
+            </a:r>
+          </a:p>
+          <a:p>
+            <a:r>
+              <a:rPr lang="en-US" altLang="zh-TW" dirty="0" smtClean="0"/>
+              <a:t>21816 </a:t>
+            </a:r>
+            <a:r>
+              <a:rPr lang="zh-TW" altLang="en-US" dirty="0" smtClean="0"/>
+              <a:t>古珉和</a:t>
+            </a:r>
+            <a:endParaRPr lang="en-US" altLang="zh-TW" dirty="0" smtClean="0"/>
+          </a:p>
+        </p:txBody>
+      </p:sp>
+    </p:spTree>
+    <p:extLst>
+      <p:ext uri="{BB962C8B-B14F-4D97-AF65-F5344CB8AC3E}">
+        <p14:creationId xmlns:p14="http://schemas.microsoft.com/office/powerpoint/2010/main" val="2122154024"/>
+      </p:ext>
+    </p:extLst>
+  </p:cSld>
+  <p:clrMapOvr>
+    <a:masterClrMapping/>
+  </p:clrMapOvr>
+  <p:timing>
+    <p:tnLst>
+      <p:par>
+        <p:cTn id="1" dur="indefinite" restart="never" nodeType="tmRoot"/>
+      </p:par>
+    </p:tnLst>
+  </p:timing>
+</p:sld>
+</file>
+
+<file path=ppt/slides/slide2.xml><?xml version="1.0" encoding="utf-8"?>
+<p:sld xmlns:a="http://schemas.openxmlformats.org/drawingml/2006/main" xmlns:r="http://schemas.openxmlformats.org/officeDocument/2006/relationships" xmlns:p="http://schemas.openxmlformats.org/presentationml/2006/main">
+  <p:cSld>
+    <p:spTree>
+      <p:nvGrpSpPr>
+        <p:cNvPr id="1" name=""/>
+        <p:cNvGrpSpPr/>
+        <p:nvPr/>
+      </p:nvGrpSpPr>
+      <p:grpSpPr>
+        <a:xfrm>
+          <a:off x="0" y="0"/>
+          <a:ext cx="0" cy="0"/>
+          <a:chOff x="0" y="0"/>
+          <a:chExt cx="0" cy="0"/>
+        </a:xfrm>
+      </p:grpSpPr>
+      <p:sp>
+        <p:nvSpPr>
+          <p:cNvPr id="2" name="標題 1"/>
+          <p:cNvSpPr>
+            <a:spLocks noGrp="1"/>
+          </p:cNvSpPr>
+          <p:nvPr>
+            <p:ph type="title"/>
+          </p:nvPr>
+        </p:nvSpPr>
+        <p:spPr/>
+        <p:txBody>
+          <a:bodyPr/>
+          <a:lstStyle/>
+          <a:p>
+            <a:endParaRPr lang="zh-TW" altLang="en-US"/>
+          </a:p>
+        </p:txBody>
+      </p:sp>
+      <p:sp>
+        <p:nvSpPr>
+          <p:cNvPr id="3" name="內容版面配置區 2"/>
+          <p:cNvSpPr>
+            <a:spLocks noGrp="1"/>
+          </p:cNvSpPr>
+          <p:nvPr>
+            <p:ph idx="1"/>
+          </p:nvPr>
+        </p:nvSpPr>
+        <p:spPr/>
+        <p:txBody>
+          <a:bodyPr/>
+          <a:lstStyle/>
+          <a:p>
+            <a:endParaRPr lang="zh-TW" altLang="en-US"/>
+          </a:p>
+        </p:txBody>
+      </p:sp>
+    </p:spTree>
+    <p:extLst>
+      <p:ext uri="{BB962C8B-B14F-4D97-AF65-F5344CB8AC3E}">
+        <p14:creationId xmlns:p14="http://schemas.microsoft.com/office/powerpoint/2010/main" val="3054888304"/>
+      </p:ext>
+    </p:extLst>
+  </p:cSld>
+  <p:clrMapOvr>
+    <a:masterClrMapping/>
+  </p:clrMapOvr>
+</p:sld>
 </file>
 
 <file path=ppt/theme/theme1.xml><?xml version="1.0" encoding="utf-8"?>

</xml_diff>